<commit_message>
Minor updates to the Functions .pptx file.
</commit_message>
<xml_diff>
--- a/presentations/03.3_Functions.pptx
+++ b/presentations/03.3_Functions.pptx
@@ -5,7 +5,7 @@
     <p:sldMasterId id="2147483648" r:id="rId1"/>
   </p:sldMasterIdLst>
   <p:notesMasterIdLst>
-    <p:notesMasterId r:id="rId20"/>
+    <p:notesMasterId r:id="rId21"/>
   </p:notesMasterIdLst>
   <p:sldIdLst>
     <p:sldId id="324" r:id="rId2"/>
@@ -21,11 +21,12 @@
     <p:sldId id="297" r:id="rId12"/>
     <p:sldId id="281" r:id="rId13"/>
     <p:sldId id="293" r:id="rId14"/>
-    <p:sldId id="279" r:id="rId15"/>
-    <p:sldId id="331" r:id="rId16"/>
-    <p:sldId id="298" r:id="rId17"/>
-    <p:sldId id="304" r:id="rId18"/>
-    <p:sldId id="303" r:id="rId19"/>
+    <p:sldId id="274" r:id="rId15"/>
+    <p:sldId id="279" r:id="rId16"/>
+    <p:sldId id="331" r:id="rId17"/>
+    <p:sldId id="298" r:id="rId18"/>
+    <p:sldId id="304" r:id="rId19"/>
+    <p:sldId id="303" r:id="rId20"/>
   </p:sldIdLst>
   <p:sldSz cx="12192000" cy="6858000"/>
   <p:notesSz cx="6858000" cy="9144000"/>
@@ -225,7 +226,7 @@
           <a:p>
             <a:fld id="{FD93C9B2-20F6-4DB1-B471-224337D0AC79}" type="datetimeFigureOut">
               <a:rPr lang="en-US" smtClean="0"/>
-              <a:t>11/14/2022</a:t>
+              <a:t>11/18/2022</a:t>
             </a:fld>
             <a:endParaRPr lang="en-US"/>
           </a:p>
@@ -1481,23 +1482,33 @@
           <a:bodyPr/>
           <a:lstStyle/>
           <a:p>
-            <a:pPr marL="0" marR="0" lvl="0" indent="0" algn="l" defTabSz="914400" rtl="0" eaLnBrk="1" fontAlgn="auto" latinLnBrk="0" hangingPunct="1">
-              <a:lnSpc>
-                <a:spcPct val="100000"/>
-              </a:lnSpc>
-              <a:spcBef>
-                <a:spcPts val="0"/>
-              </a:spcBef>
-              <a:spcAft>
-                <a:spcPts val="0"/>
-              </a:spcAft>
-              <a:buClrTx/>
-              <a:buSzTx/>
-              <a:buFontTx/>
-              <a:buNone/>
-              <a:tabLst/>
-              <a:defRPr/>
+            <a:r>
+              <a:rPr lang="en-US" dirty="0"/>
+              <a:t>Flowcharts and/or Pseudocode are your friends!</a:t>
+            </a:r>
+            <a:endParaRPr lang="en-US" sz="2400" dirty="0"/>
+          </a:p>
+          <a:p>
+            <a:pPr marL="800100" lvl="1" indent="-342900">
+              <a:buFont typeface="Arial" panose="020B0604020202020204" pitchFamily="34" charset="0"/>
+              <a:buChar char="•"/>
             </a:pPr>
+            <a:r>
+              <a:rPr lang="en-US" sz="2400" dirty="0"/>
+              <a:t>A picture is worth a thousand words.</a:t>
+            </a:r>
+          </a:p>
+          <a:p>
+            <a:pPr marL="800100" lvl="1" indent="-342900">
+              <a:buFont typeface="Arial" panose="020B0604020202020204" pitchFamily="34" charset="0"/>
+              <a:buChar char="•"/>
+            </a:pPr>
+            <a:r>
+              <a:rPr lang="en-US" sz="2400" dirty="0"/>
+              <a:t>Flowcharts and pseudocode are useful software design tools.</a:t>
+            </a:r>
+          </a:p>
+          <a:p>
             <a:endParaRPr lang="en-US" dirty="0"/>
           </a:p>
         </p:txBody>
@@ -1528,7 +1539,7 @@
     </p:spTree>
     <p:extLst>
       <p:ext uri="{BB962C8B-B14F-4D97-AF65-F5344CB8AC3E}">
-        <p14:creationId xmlns:p14="http://schemas.microsoft.com/office/powerpoint/2010/main" val="1985664105"/>
+        <p14:creationId xmlns:p14="http://schemas.microsoft.com/office/powerpoint/2010/main" val="74931409"/>
       </p:ext>
     </p:extLst>
   </p:cSld>
@@ -1620,7 +1631,7 @@
           <a:p>
             <a:fld id="{3148858F-F1DB-4027-9C85-CCA6849540DD}" type="slidenum">
               <a:rPr lang="en-US" smtClean="0"/>
-              <a:t>16</a:t>
+              <a:t>15</a:t>
             </a:fld>
             <a:endParaRPr lang="en-US"/>
           </a:p>
@@ -1629,7 +1640,7 @@
     </p:spTree>
     <p:extLst>
       <p:ext uri="{BB962C8B-B14F-4D97-AF65-F5344CB8AC3E}">
-        <p14:creationId xmlns:p14="http://schemas.microsoft.com/office/powerpoint/2010/main" val="3830469567"/>
+        <p14:creationId xmlns:p14="http://schemas.microsoft.com/office/powerpoint/2010/main" val="1985664105"/>
       </p:ext>
     </p:extLst>
   </p:cSld>
@@ -1683,27 +1694,24 @@
           <a:bodyPr/>
           <a:lstStyle/>
           <a:p>
-            <a:pPr algn="l"/>
-            <a:r>
-              <a:rPr lang="en-US" sz="4000" b="0" i="0" dirty="0">
-                <a:solidFill>
-                  <a:srgbClr val="292929"/>
-                </a:solidFill>
-                <a:effectLst/>
-                <a:latin typeface="charter"/>
-              </a:rPr>
-              <a:t>Think of a class as a blueprint for how an object may operate. The object is a particular instance derived from the class. For example, an object could represent a particular person with attributes including name, age, address, etc., and methods like walking, talking, breathing, and running.  Here the object is Pikachu, derived from the class Pokemon.  Keep in mind: methods define what a given object can do while attributes define its features.  </a:t>
-            </a:r>
-          </a:p>
-          <a:p>
-            <a:pPr algn="l"/>
-            <a:endParaRPr lang="en-US" sz="2800" b="0" i="0" dirty="0">
-              <a:solidFill>
-                <a:srgbClr val="090909"/>
-              </a:solidFill>
-              <a:effectLst/>
-              <a:latin typeface="-apple-system"/>
-            </a:endParaRPr>
+            <a:pPr marL="0" marR="0" lvl="0" indent="0" algn="l" defTabSz="914400" rtl="0" eaLnBrk="1" fontAlgn="auto" latinLnBrk="0" hangingPunct="1">
+              <a:lnSpc>
+                <a:spcPct val="100000"/>
+              </a:lnSpc>
+              <a:spcBef>
+                <a:spcPts val="0"/>
+              </a:spcBef>
+              <a:spcAft>
+                <a:spcPts val="0"/>
+              </a:spcAft>
+              <a:buClrTx/>
+              <a:buSzTx/>
+              <a:buFontTx/>
+              <a:buNone/>
+              <a:tabLst/>
+              <a:defRPr/>
+            </a:pPr>
+            <a:endParaRPr lang="en-US" dirty="0"/>
           </a:p>
         </p:txBody>
       </p:sp>
@@ -1733,7 +1741,7 @@
     </p:spTree>
     <p:extLst>
       <p:ext uri="{BB962C8B-B14F-4D97-AF65-F5344CB8AC3E}">
-        <p14:creationId xmlns:p14="http://schemas.microsoft.com/office/powerpoint/2010/main" val="473516458"/>
+        <p14:creationId xmlns:p14="http://schemas.microsoft.com/office/powerpoint/2010/main" val="3830469567"/>
       </p:ext>
     </p:extLst>
   </p:cSld>
@@ -1789,67 +1797,24 @@
           <a:p>
             <a:pPr algn="l"/>
             <a:r>
-              <a:rPr lang="en-US" sz="1800" b="0" i="0" dirty="0">
+              <a:rPr lang="en-US" sz="4000" b="0" i="0" dirty="0">
                 <a:solidFill>
                   <a:srgbClr val="292929"/>
                 </a:solidFill>
                 <a:effectLst/>
                 <a:latin typeface="charter"/>
               </a:rPr>
-              <a:t>In the previous slide, I indicated that an object is a particular instance of a class.  In technical terms, we say that objects are </a:t>
-            </a:r>
-            <a:r>
-              <a:rPr lang="en-US" sz="1800" b="1" i="0" dirty="0">
-                <a:solidFill>
-                  <a:srgbClr val="292929"/>
-                </a:solidFill>
-                <a:effectLst/>
-                <a:latin typeface="Charter"/>
-              </a:rPr>
-              <a:t>instantiated</a:t>
-            </a:r>
-            <a:r>
-              <a:rPr lang="en-US" sz="1800" b="0" i="0" dirty="0">
-                <a:solidFill>
-                  <a:srgbClr val="292929"/>
-                </a:solidFill>
-                <a:effectLst/>
-                <a:latin typeface="charter"/>
-              </a:rPr>
-              <a:t>.  That is, they are actual things you can manipulate in code.  Interestingly, we can create hierarchies of classes.  </a:t>
-            </a:r>
-            <a:r>
-              <a:rPr lang="en-US" sz="2800" b="0" i="0" dirty="0">
-                <a:solidFill>
-                  <a:srgbClr val="212529"/>
-                </a:solidFill>
-                <a:effectLst/>
-                <a:latin typeface="-apple-system"/>
-              </a:rPr>
-              <a:t>In Object-Oriented Programming, when a class derives from another class, it’s called </a:t>
-            </a:r>
-            <a:r>
-              <a:rPr lang="en-US" sz="2800" b="1" i="0" dirty="0">
-                <a:solidFill>
-                  <a:srgbClr val="212529"/>
-                </a:solidFill>
-                <a:effectLst/>
-                <a:latin typeface="-apple-system"/>
-              </a:rPr>
-              <a:t>inheritance</a:t>
-            </a:r>
-            <a:r>
-              <a:rPr lang="en-US" sz="2800" b="0" i="0" dirty="0">
-                <a:solidFill>
-                  <a:srgbClr val="212529"/>
-                </a:solidFill>
-                <a:effectLst/>
-                <a:latin typeface="-apple-system"/>
-              </a:rPr>
-              <a:t>.</a:t>
-            </a:r>
-            <a:endParaRPr lang="en-US" sz="1800" b="0" i="0" u="none" strike="noStrike" baseline="0" dirty="0">
-              <a:latin typeface="Arial" panose="020B0604020202020204" pitchFamily="34" charset="0"/>
+              <a:t>Think of a class as a blueprint for how an object may operate. The object is a particular instance derived from the class. For example, an object could represent a particular person with attributes including name, age, address, etc., and methods like walking, talking, breathing, and running.  Here the object is Pikachu, derived from the class Pokemon.  Keep in mind: methods define what a given object can do while attributes define its features.  </a:t>
+            </a:r>
+          </a:p>
+          <a:p>
+            <a:pPr algn="l"/>
+            <a:endParaRPr lang="en-US" sz="2800" b="0" i="0" dirty="0">
+              <a:solidFill>
+                <a:srgbClr val="090909"/>
+              </a:solidFill>
+              <a:effectLst/>
+              <a:latin typeface="-apple-system"/>
             </a:endParaRPr>
           </a:p>
         </p:txBody>
@@ -1872,6 +1837,153 @@
             <a:fld id="{3148858F-F1DB-4027-9C85-CCA6849540DD}" type="slidenum">
               <a:rPr lang="en-US" smtClean="0"/>
               <a:t>18</a:t>
+            </a:fld>
+            <a:endParaRPr lang="en-US"/>
+          </a:p>
+        </p:txBody>
+      </p:sp>
+    </p:spTree>
+    <p:extLst>
+      <p:ext uri="{BB962C8B-B14F-4D97-AF65-F5344CB8AC3E}">
+        <p14:creationId xmlns:p14="http://schemas.microsoft.com/office/powerpoint/2010/main" val="473516458"/>
+      </p:ext>
+    </p:extLst>
+  </p:cSld>
+  <p:clrMapOvr>
+    <a:masterClrMapping/>
+  </p:clrMapOvr>
+</p:notes>
+</file>
+
+<file path=ppt/notesSlides/notesSlide18.xml><?xml version="1.0" encoding="utf-8"?>
+<p:notes xmlns:a="http://schemas.openxmlformats.org/drawingml/2006/main" xmlns:r="http://schemas.openxmlformats.org/officeDocument/2006/relationships" xmlns:p="http://schemas.openxmlformats.org/presentationml/2006/main">
+  <p:cSld>
+    <p:spTree>
+      <p:nvGrpSpPr>
+        <p:cNvPr id="1" name=""/>
+        <p:cNvGrpSpPr/>
+        <p:nvPr/>
+      </p:nvGrpSpPr>
+      <p:grpSpPr>
+        <a:xfrm>
+          <a:off x="0" y="0"/>
+          <a:ext cx="0" cy="0"/>
+          <a:chOff x="0" y="0"/>
+          <a:chExt cx="0" cy="0"/>
+        </a:xfrm>
+      </p:grpSpPr>
+      <p:sp>
+        <p:nvSpPr>
+          <p:cNvPr id="2" name="Slide Image Placeholder 1"/>
+          <p:cNvSpPr>
+            <a:spLocks noGrp="1" noRot="1" noChangeAspect="1"/>
+          </p:cNvSpPr>
+          <p:nvPr>
+            <p:ph type="sldImg"/>
+          </p:nvPr>
+        </p:nvSpPr>
+        <p:spPr/>
+      </p:sp>
+      <p:sp>
+        <p:nvSpPr>
+          <p:cNvPr id="3" name="Notes Placeholder 2"/>
+          <p:cNvSpPr>
+            <a:spLocks noGrp="1"/>
+          </p:cNvSpPr>
+          <p:nvPr>
+            <p:ph type="body" idx="1"/>
+          </p:nvPr>
+        </p:nvSpPr>
+        <p:spPr/>
+        <p:txBody>
+          <a:bodyPr/>
+          <a:lstStyle/>
+          <a:p>
+            <a:pPr algn="l"/>
+            <a:r>
+              <a:rPr lang="en-US" sz="1800" b="0" i="0" dirty="0">
+                <a:solidFill>
+                  <a:srgbClr val="292929"/>
+                </a:solidFill>
+                <a:effectLst/>
+                <a:latin typeface="charter"/>
+              </a:rPr>
+              <a:t>In the previous slide, I indicated that an object is a particular instance of a class.  In technical terms, we say that objects are </a:t>
+            </a:r>
+            <a:r>
+              <a:rPr lang="en-US" sz="1800" b="1" i="0" dirty="0">
+                <a:solidFill>
+                  <a:srgbClr val="292929"/>
+                </a:solidFill>
+                <a:effectLst/>
+                <a:latin typeface="Charter"/>
+              </a:rPr>
+              <a:t>instantiated</a:t>
+            </a:r>
+            <a:r>
+              <a:rPr lang="en-US" sz="1800" b="0" i="0" dirty="0">
+                <a:solidFill>
+                  <a:srgbClr val="292929"/>
+                </a:solidFill>
+                <a:effectLst/>
+                <a:latin typeface="charter"/>
+              </a:rPr>
+              <a:t>.  That is, they are actual things you can manipulate in code.  Interestingly, we can create hierarchies of classes.  </a:t>
+            </a:r>
+            <a:r>
+              <a:rPr lang="en-US" sz="2800" b="0" i="0" dirty="0">
+                <a:solidFill>
+                  <a:srgbClr val="212529"/>
+                </a:solidFill>
+                <a:effectLst/>
+                <a:latin typeface="-apple-system"/>
+              </a:rPr>
+              <a:t>In Object-Oriented Programming, when a class derives from another class, it’s called </a:t>
+            </a:r>
+            <a:r>
+              <a:rPr lang="en-US" sz="2800" b="1" i="0" dirty="0">
+                <a:solidFill>
+                  <a:srgbClr val="212529"/>
+                </a:solidFill>
+                <a:effectLst/>
+                <a:latin typeface="-apple-system"/>
+              </a:rPr>
+              <a:t>inheritance</a:t>
+            </a:r>
+            <a:r>
+              <a:rPr lang="en-US" sz="2800" b="0" i="0" dirty="0">
+                <a:solidFill>
+                  <a:srgbClr val="212529"/>
+                </a:solidFill>
+                <a:effectLst/>
+                <a:latin typeface="-apple-system"/>
+              </a:rPr>
+              <a:t>.</a:t>
+            </a:r>
+            <a:endParaRPr lang="en-US" sz="1800" b="0" i="0" u="none" strike="noStrike" baseline="0" dirty="0">
+              <a:latin typeface="Arial" panose="020B0604020202020204" pitchFamily="34" charset="0"/>
+            </a:endParaRPr>
+          </a:p>
+        </p:txBody>
+      </p:sp>
+      <p:sp>
+        <p:nvSpPr>
+          <p:cNvPr id="4" name="Slide Number Placeholder 3"/>
+          <p:cNvSpPr>
+            <a:spLocks noGrp="1"/>
+          </p:cNvSpPr>
+          <p:nvPr>
+            <p:ph type="sldNum" sz="quarter" idx="5"/>
+          </p:nvPr>
+        </p:nvSpPr>
+        <p:spPr/>
+        <p:txBody>
+          <a:bodyPr/>
+          <a:lstStyle/>
+          <a:p>
+            <a:fld id="{3148858F-F1DB-4027-9C85-CCA6849540DD}" type="slidenum">
+              <a:rPr lang="en-US" smtClean="0"/>
+              <a:t>19</a:t>
             </a:fld>
             <a:endParaRPr lang="en-US"/>
           </a:p>
@@ -3378,7 +3490,7 @@
           <a:p>
             <a:fld id="{C3F78080-8D0A-4BE8-A5B4-CB115102D524}" type="datetimeFigureOut">
               <a:rPr lang="en-US" smtClean="0"/>
-              <a:t>11/14/2022</a:t>
+              <a:t>11/18/2022</a:t>
             </a:fld>
             <a:endParaRPr lang="en-US"/>
           </a:p>
@@ -3576,7 +3688,7 @@
           <a:p>
             <a:fld id="{C3F78080-8D0A-4BE8-A5B4-CB115102D524}" type="datetimeFigureOut">
               <a:rPr lang="en-US" smtClean="0"/>
-              <a:t>11/14/2022</a:t>
+              <a:t>11/18/2022</a:t>
             </a:fld>
             <a:endParaRPr lang="en-US"/>
           </a:p>
@@ -3784,7 +3896,7 @@
           <a:p>
             <a:fld id="{C3F78080-8D0A-4BE8-A5B4-CB115102D524}" type="datetimeFigureOut">
               <a:rPr lang="en-US" smtClean="0"/>
-              <a:t>11/14/2022</a:t>
+              <a:t>11/18/2022</a:t>
             </a:fld>
             <a:endParaRPr lang="en-US"/>
           </a:p>
@@ -3982,7 +4094,7 @@
           <a:p>
             <a:fld id="{C3F78080-8D0A-4BE8-A5B4-CB115102D524}" type="datetimeFigureOut">
               <a:rPr lang="en-US" smtClean="0"/>
-              <a:t>11/14/2022</a:t>
+              <a:t>11/18/2022</a:t>
             </a:fld>
             <a:endParaRPr lang="en-US"/>
           </a:p>
@@ -4257,7 +4369,7 @@
           <a:p>
             <a:fld id="{C3F78080-8D0A-4BE8-A5B4-CB115102D524}" type="datetimeFigureOut">
               <a:rPr lang="en-US" smtClean="0"/>
-              <a:t>11/14/2022</a:t>
+              <a:t>11/18/2022</a:t>
             </a:fld>
             <a:endParaRPr lang="en-US"/>
           </a:p>
@@ -4522,7 +4634,7 @@
           <a:p>
             <a:fld id="{C3F78080-8D0A-4BE8-A5B4-CB115102D524}" type="datetimeFigureOut">
               <a:rPr lang="en-US" smtClean="0"/>
-              <a:t>11/14/2022</a:t>
+              <a:t>11/18/2022</a:t>
             </a:fld>
             <a:endParaRPr lang="en-US"/>
           </a:p>
@@ -4934,7 +5046,7 @@
           <a:p>
             <a:fld id="{C3F78080-8D0A-4BE8-A5B4-CB115102D524}" type="datetimeFigureOut">
               <a:rPr lang="en-US" smtClean="0"/>
-              <a:t>11/14/2022</a:t>
+              <a:t>11/18/2022</a:t>
             </a:fld>
             <a:endParaRPr lang="en-US"/>
           </a:p>
@@ -5075,7 +5187,7 @@
           <a:p>
             <a:fld id="{C3F78080-8D0A-4BE8-A5B4-CB115102D524}" type="datetimeFigureOut">
               <a:rPr lang="en-US" smtClean="0"/>
-              <a:t>11/14/2022</a:t>
+              <a:t>11/18/2022</a:t>
             </a:fld>
             <a:endParaRPr lang="en-US"/>
           </a:p>
@@ -5188,7 +5300,7 @@
           <a:p>
             <a:fld id="{C3F78080-8D0A-4BE8-A5B4-CB115102D524}" type="datetimeFigureOut">
               <a:rPr lang="en-US" smtClean="0"/>
-              <a:t>11/14/2022</a:t>
+              <a:t>11/18/2022</a:t>
             </a:fld>
             <a:endParaRPr lang="en-US"/>
           </a:p>
@@ -5499,7 +5611,7 @@
           <a:p>
             <a:fld id="{C3F78080-8D0A-4BE8-A5B4-CB115102D524}" type="datetimeFigureOut">
               <a:rPr lang="en-US" smtClean="0"/>
-              <a:t>11/14/2022</a:t>
+              <a:t>11/18/2022</a:t>
             </a:fld>
             <a:endParaRPr lang="en-US"/>
           </a:p>
@@ -5787,7 +5899,7 @@
           <a:p>
             <a:fld id="{C3F78080-8D0A-4BE8-A5B4-CB115102D524}" type="datetimeFigureOut">
               <a:rPr lang="en-US" smtClean="0"/>
-              <a:t>11/14/2022</a:t>
+              <a:t>11/18/2022</a:t>
             </a:fld>
             <a:endParaRPr lang="en-US"/>
           </a:p>
@@ -6028,7 +6140,7 @@
           <a:p>
             <a:fld id="{C3F78080-8D0A-4BE8-A5B4-CB115102D524}" type="datetimeFigureOut">
               <a:rPr lang="en-US" smtClean="0"/>
-              <a:t>11/14/2022</a:t>
+              <a:t>11/18/2022</a:t>
             </a:fld>
             <a:endParaRPr lang="en-US"/>
           </a:p>
@@ -7942,8 +8054,8 @@
         </p:blipFill>
         <p:spPr>
           <a:xfrm>
-            <a:off x="12465590" y="5054352"/>
-            <a:ext cx="12192000" cy="1280509"/>
+            <a:off x="470004" y="5020519"/>
+            <a:ext cx="11560631" cy="1280509"/>
           </a:xfrm>
           <a:prstGeom prst="rect">
             <a:avLst/>
@@ -8410,6 +8522,105 @@
       </p:grpSpPr>
       <p:sp>
         <p:nvSpPr>
+          <p:cNvPr id="2" name="Title 1">
+            <a:extLst>
+              <a:ext uri="{FF2B5EF4-FFF2-40B4-BE49-F238E27FC236}">
+                <a16:creationId xmlns:a16="http://schemas.microsoft.com/office/drawing/2014/main" id="{AE4AD477-2F27-43DA-A448-3AE11C8CB1B0}"/>
+              </a:ext>
+            </a:extLst>
+          </p:cNvPr>
+          <p:cNvSpPr>
+            <a:spLocks noGrp="1"/>
+          </p:cNvSpPr>
+          <p:nvPr>
+            <p:ph type="title"/>
+          </p:nvPr>
+        </p:nvSpPr>
+        <p:spPr>
+          <a:xfrm>
+            <a:off x="0" y="365127"/>
+            <a:ext cx="12192000" cy="1325563"/>
+          </a:xfrm>
+        </p:spPr>
+        <p:txBody>
+          <a:bodyPr anchor="ctr">
+            <a:normAutofit/>
+          </a:bodyPr>
+          <a:lstStyle/>
+          <a:p>
+            <a:pPr algn="ctr"/>
+            <a:r>
+              <a:rPr lang="en-US" dirty="0">
+                <a:latin typeface="Avenir Heavy"/>
+              </a:rPr>
+              <a:t>Flowcharts and Pseudocode</a:t>
+            </a:r>
+          </a:p>
+        </p:txBody>
+      </p:sp>
+      <p:pic>
+        <p:nvPicPr>
+          <p:cNvPr id="4" name="Picture 3">
+            <a:extLst>
+              <a:ext uri="{FF2B5EF4-FFF2-40B4-BE49-F238E27FC236}">
+                <a16:creationId xmlns:a16="http://schemas.microsoft.com/office/drawing/2014/main" id="{D44341CC-A466-4BEB-BA31-36548FF91DB8}"/>
+              </a:ext>
+            </a:extLst>
+          </p:cNvPr>
+          <p:cNvPicPr>
+            <a:picLocks noChangeAspect="1"/>
+          </p:cNvPicPr>
+          <p:nvPr/>
+        </p:nvPicPr>
+        <p:blipFill>
+          <a:blip r:embed="rId3"/>
+          <a:stretch>
+            <a:fillRect/>
+          </a:stretch>
+        </p:blipFill>
+        <p:spPr>
+          <a:xfrm>
+            <a:off x="4317391" y="1690690"/>
+            <a:ext cx="3557218" cy="4351338"/>
+          </a:xfrm>
+          <a:prstGeom prst="rect">
+            <a:avLst/>
+          </a:prstGeom>
+          <a:noFill/>
+        </p:spPr>
+      </p:pic>
+    </p:spTree>
+    <p:extLst>
+      <p:ext uri="{BB962C8B-B14F-4D97-AF65-F5344CB8AC3E}">
+        <p14:creationId xmlns:p14="http://schemas.microsoft.com/office/powerpoint/2010/main" val="2633006781"/>
+      </p:ext>
+    </p:extLst>
+  </p:cSld>
+  <p:clrMapOvr>
+    <a:masterClrMapping/>
+  </p:clrMapOvr>
+</p:sld>
+</file>
+
+<file path=ppt/slides/slide15.xml><?xml version="1.0" encoding="utf-8"?>
+<p:sld xmlns:a="http://schemas.openxmlformats.org/drawingml/2006/main" xmlns:r="http://schemas.openxmlformats.org/officeDocument/2006/relationships" xmlns:p="http://schemas.openxmlformats.org/presentationml/2006/main">
+  <p:cSld>
+    <p:spTree>
+      <p:nvGrpSpPr>
+        <p:cNvPr id="1" name=""/>
+        <p:cNvGrpSpPr/>
+        <p:nvPr/>
+      </p:nvGrpSpPr>
+      <p:grpSpPr>
+        <a:xfrm>
+          <a:off x="0" y="0"/>
+          <a:ext cx="0" cy="0"/>
+          <a:chOff x="0" y="0"/>
+          <a:chExt cx="0" cy="0"/>
+        </a:xfrm>
+      </p:grpSpPr>
+      <p:sp>
+        <p:nvSpPr>
           <p:cNvPr id="4" name="TextBox 3">
             <a:extLst>
               <a:ext uri="{FF2B5EF4-FFF2-40B4-BE49-F238E27FC236}">
@@ -8691,7 +8902,7 @@
 </p:sld>
 </file>
 
-<file path=ppt/slides/slide15.xml><?xml version="1.0" encoding="utf-8"?>
+<file path=ppt/slides/slide16.xml><?xml version="1.0" encoding="utf-8"?>
 <p:sld xmlns:a="http://schemas.openxmlformats.org/drawingml/2006/main" xmlns:r="http://schemas.openxmlformats.org/officeDocument/2006/relationships" xmlns:p="http://schemas.openxmlformats.org/presentationml/2006/main">
   <p:cSld>
     <p:spTree>
@@ -8771,7 +8982,7 @@
 </p:sld>
 </file>
 
-<file path=ppt/slides/slide16.xml><?xml version="1.0" encoding="utf-8"?>
+<file path=ppt/slides/slide17.xml><?xml version="1.0" encoding="utf-8"?>
 <p:sld xmlns:a="http://schemas.openxmlformats.org/drawingml/2006/main" xmlns:r="http://schemas.openxmlformats.org/officeDocument/2006/relationships" xmlns:p="http://schemas.openxmlformats.org/presentationml/2006/main">
   <p:cSld>
     <p:spTree>
@@ -8925,7 +9136,7 @@
 </p:sld>
 </file>
 
-<file path=ppt/slides/slide17.xml><?xml version="1.0" encoding="utf-8"?>
+<file path=ppt/slides/slide18.xml><?xml version="1.0" encoding="utf-8"?>
 <p:sld xmlns:a="http://schemas.openxmlformats.org/drawingml/2006/main" xmlns:r="http://schemas.openxmlformats.org/officeDocument/2006/relationships" xmlns:p="http://schemas.openxmlformats.org/presentationml/2006/main">
   <p:cSld>
     <p:spTree>
@@ -9106,7 +9317,7 @@
 </p:sld>
 </file>
 
-<file path=ppt/slides/slide18.xml><?xml version="1.0" encoding="utf-8"?>
+<file path=ppt/slides/slide19.xml><?xml version="1.0" encoding="utf-8"?>
 <p:sld xmlns:a="http://schemas.openxmlformats.org/drawingml/2006/main" xmlns:r="http://schemas.openxmlformats.org/officeDocument/2006/relationships" xmlns:p="http://schemas.openxmlformats.org/presentationml/2006/main">
   <p:cSld>
     <p:spTree>

</xml_diff>